<commit_message>
added f9 and f10
</commit_message>
<xml_diff>
--- a/2022/slides.pptx
+++ b/2022/slides.pptx
@@ -199,7 +199,7 @@
           <a:p>
             <a:fld id="{B26C93B3-9E12-144F-AA8A-0E52A791644D}" type="datetimeFigureOut">
               <a:rPr lang="en-US" smtClean="0"/>
-              <a:t>5/5/2022</a:t>
+              <a:t>5/10/2022</a:t>
             </a:fld>
             <a:endParaRPr lang="en-US"/>
           </a:p>
@@ -2118,7 +2118,12 @@
             <p:ph idx="10"/>
           </p:nvPr>
         </p:nvSpPr>
-        <p:spPr/>
+        <p:spPr>
+          <a:xfrm>
+            <a:off x="1154895" y="1186738"/>
+            <a:ext cx="14188291" cy="7549638"/>
+          </a:xfrm>
+        </p:spPr>
         <p:txBody>
           <a:bodyPr/>
           <a:lstStyle/>
@@ -2851,33 +2856,15 @@
                                   </p:childTnLst>
                                 </p:cTn>
                               </p:par>
-                            </p:childTnLst>
-                          </p:cTn>
-                        </p:par>
-                      </p:childTnLst>
-                    </p:cTn>
-                  </p:par>
-                  <p:par>
-                    <p:cTn id="33" fill="hold">
-                      <p:stCondLst>
-                        <p:cond delay="indefinite"/>
-                      </p:stCondLst>
-                      <p:childTnLst>
-                        <p:par>
-                          <p:cTn id="34" fill="hold">
-                            <p:stCondLst>
-                              <p:cond delay="0"/>
-                            </p:stCondLst>
-                            <p:childTnLst>
                               <p:par>
-                                <p:cTn id="35" presetID="2" presetClass="entr" presetSubtype="4" fill="hold" grpId="0" nodeType="clickEffect">
+                                <p:cTn id="33" presetID="2" presetClass="entr" presetSubtype="4" fill="hold" grpId="0" nodeType="withEffect">
                                   <p:stCondLst>
                                     <p:cond delay="0"/>
                                   </p:stCondLst>
                                   <p:childTnLst>
                                     <p:set>
                                       <p:cBhvr>
-                                        <p:cTn id="36" dur="1" fill="hold">
+                                        <p:cTn id="34" dur="1" fill="hold">
                                           <p:stCondLst>
                                             <p:cond delay="0"/>
                                           </p:stCondLst>
@@ -2899,7 +2886,7 @@
                                     </p:set>
                                     <p:anim calcmode="lin" valueType="num">
                                       <p:cBhvr additive="base">
-                                        <p:cTn id="37" dur="500" fill="hold"/>
+                                        <p:cTn id="35" dur="500" fill="hold"/>
                                         <p:tgtEl>
                                           <p:spTgt spid="4">
                                             <p:txEl>
@@ -2926,7 +2913,7 @@
                                     </p:anim>
                                     <p:anim calcmode="lin" valueType="num">
                                       <p:cBhvr additive="base">
-                                        <p:cTn id="38" dur="500" fill="hold"/>
+                                        <p:cTn id="36" dur="500" fill="hold"/>
                                         <p:tgtEl>
                                           <p:spTgt spid="4">
                                             <p:txEl>
@@ -2961,26 +2948,26 @@
                     </p:cTn>
                   </p:par>
                   <p:par>
-                    <p:cTn id="39" fill="hold">
+                    <p:cTn id="37" fill="hold">
                       <p:stCondLst>
                         <p:cond delay="indefinite"/>
                       </p:stCondLst>
                       <p:childTnLst>
                         <p:par>
-                          <p:cTn id="40" fill="hold">
+                          <p:cTn id="38" fill="hold">
                             <p:stCondLst>
                               <p:cond delay="0"/>
                             </p:stCondLst>
                             <p:childTnLst>
                               <p:par>
-                                <p:cTn id="41" presetID="2" presetClass="entr" presetSubtype="4" fill="hold" grpId="0" nodeType="clickEffect">
+                                <p:cTn id="39" presetID="2" presetClass="entr" presetSubtype="4" fill="hold" grpId="0" nodeType="clickEffect">
                                   <p:stCondLst>
                                     <p:cond delay="0"/>
                                   </p:stCondLst>
                                   <p:childTnLst>
                                     <p:set>
                                       <p:cBhvr>
-                                        <p:cTn id="42" dur="1" fill="hold">
+                                        <p:cTn id="40" dur="1" fill="hold">
                                           <p:stCondLst>
                                             <p:cond delay="0"/>
                                           </p:stCondLst>
@@ -3002,7 +2989,7 @@
                                     </p:set>
                                     <p:anim calcmode="lin" valueType="num">
                                       <p:cBhvr additive="base">
-                                        <p:cTn id="43" dur="500" fill="hold"/>
+                                        <p:cTn id="41" dur="500" fill="hold"/>
                                         <p:tgtEl>
                                           <p:spTgt spid="4">
                                             <p:txEl>
@@ -3029,7 +3016,7 @@
                                     </p:anim>
                                     <p:anim calcmode="lin" valueType="num">
                                       <p:cBhvr additive="base">
-                                        <p:cTn id="44" dur="500" fill="hold"/>
+                                        <p:cTn id="42" dur="500" fill="hold"/>
                                         <p:tgtEl>
                                           <p:spTgt spid="4">
                                             <p:txEl>
@@ -3057,33 +3044,15 @@
                                   </p:childTnLst>
                                 </p:cTn>
                               </p:par>
-                            </p:childTnLst>
-                          </p:cTn>
-                        </p:par>
-                      </p:childTnLst>
-                    </p:cTn>
-                  </p:par>
-                  <p:par>
-                    <p:cTn id="45" fill="hold">
-                      <p:stCondLst>
-                        <p:cond delay="indefinite"/>
-                      </p:stCondLst>
-                      <p:childTnLst>
-                        <p:par>
-                          <p:cTn id="46" fill="hold">
-                            <p:stCondLst>
-                              <p:cond delay="0"/>
-                            </p:stCondLst>
-                            <p:childTnLst>
                               <p:par>
-                                <p:cTn id="47" presetID="2" presetClass="entr" presetSubtype="4" fill="hold" grpId="0" nodeType="clickEffect">
+                                <p:cTn id="43" presetID="2" presetClass="entr" presetSubtype="4" fill="hold" grpId="0" nodeType="withEffect">
                                   <p:stCondLst>
                                     <p:cond delay="0"/>
                                   </p:stCondLst>
                                   <p:childTnLst>
                                     <p:set>
                                       <p:cBhvr>
-                                        <p:cTn id="48" dur="1" fill="hold">
+                                        <p:cTn id="44" dur="1" fill="hold">
                                           <p:stCondLst>
                                             <p:cond delay="0"/>
                                           </p:stCondLst>
@@ -3105,7 +3074,7 @@
                                     </p:set>
                                     <p:anim calcmode="lin" valueType="num">
                                       <p:cBhvr additive="base">
-                                        <p:cTn id="49" dur="500" fill="hold"/>
+                                        <p:cTn id="45" dur="500" fill="hold"/>
                                         <p:tgtEl>
                                           <p:spTgt spid="4">
                                             <p:txEl>
@@ -3132,7 +3101,7 @@
                                     </p:anim>
                                     <p:anim calcmode="lin" valueType="num">
                                       <p:cBhvr additive="base">
-                                        <p:cTn id="50" dur="500" fill="hold"/>
+                                        <p:cTn id="46" dur="500" fill="hold"/>
                                         <p:tgtEl>
                                           <p:spTgt spid="4">
                                             <p:txEl>
@@ -3167,26 +3136,26 @@
                     </p:cTn>
                   </p:par>
                   <p:par>
-                    <p:cTn id="51" fill="hold">
+                    <p:cTn id="47" fill="hold">
                       <p:stCondLst>
                         <p:cond delay="indefinite"/>
                       </p:stCondLst>
                       <p:childTnLst>
                         <p:par>
-                          <p:cTn id="52" fill="hold">
+                          <p:cTn id="48" fill="hold">
                             <p:stCondLst>
                               <p:cond delay="0"/>
                             </p:stCondLst>
                             <p:childTnLst>
                               <p:par>
-                                <p:cTn id="53" presetID="2" presetClass="entr" presetSubtype="4" fill="hold" grpId="0" nodeType="clickEffect">
+                                <p:cTn id="49" presetID="2" presetClass="entr" presetSubtype="4" fill="hold" grpId="0" nodeType="clickEffect">
                                   <p:stCondLst>
                                     <p:cond delay="0"/>
                                   </p:stCondLst>
                                   <p:childTnLst>
                                     <p:set>
                                       <p:cBhvr>
-                                        <p:cTn id="54" dur="1" fill="hold">
+                                        <p:cTn id="50" dur="1" fill="hold">
                                           <p:stCondLst>
                                             <p:cond delay="0"/>
                                           </p:stCondLst>
@@ -3208,7 +3177,7 @@
                                     </p:set>
                                     <p:anim calcmode="lin" valueType="num">
                                       <p:cBhvr additive="base">
-                                        <p:cTn id="55" dur="500" fill="hold"/>
+                                        <p:cTn id="51" dur="500" fill="hold"/>
                                         <p:tgtEl>
                                           <p:spTgt spid="4">
                                             <p:txEl>
@@ -3235,7 +3204,7 @@
                                     </p:anim>
                                     <p:anim calcmode="lin" valueType="num">
                                       <p:cBhvr additive="base">
-                                        <p:cTn id="56" dur="500" fill="hold"/>
+                                        <p:cTn id="52" dur="500" fill="hold"/>
                                         <p:tgtEl>
                                           <p:spTgt spid="4">
                                             <p:txEl>
@@ -3270,26 +3239,26 @@
                     </p:cTn>
                   </p:par>
                   <p:par>
-                    <p:cTn id="57" fill="hold">
+                    <p:cTn id="53" fill="hold">
                       <p:stCondLst>
                         <p:cond delay="indefinite"/>
                       </p:stCondLst>
                       <p:childTnLst>
                         <p:par>
-                          <p:cTn id="58" fill="hold">
+                          <p:cTn id="54" fill="hold">
                             <p:stCondLst>
                               <p:cond delay="0"/>
                             </p:stCondLst>
                             <p:childTnLst>
                               <p:par>
-                                <p:cTn id="59" presetID="2" presetClass="entr" presetSubtype="4" fill="hold" grpId="0" nodeType="clickEffect">
+                                <p:cTn id="55" presetID="2" presetClass="entr" presetSubtype="4" fill="hold" grpId="0" nodeType="clickEffect">
                                   <p:stCondLst>
                                     <p:cond delay="0"/>
                                   </p:stCondLst>
                                   <p:childTnLst>
                                     <p:set>
                                       <p:cBhvr>
-                                        <p:cTn id="60" dur="1" fill="hold">
+                                        <p:cTn id="56" dur="1" fill="hold">
                                           <p:stCondLst>
                                             <p:cond delay="0"/>
                                           </p:stCondLst>
@@ -3311,7 +3280,7 @@
                                     </p:set>
                                     <p:anim calcmode="lin" valueType="num">
                                       <p:cBhvr additive="base">
-                                        <p:cTn id="61" dur="500" fill="hold"/>
+                                        <p:cTn id="57" dur="500" fill="hold"/>
                                         <p:tgtEl>
                                           <p:spTgt spid="4">
                                             <p:txEl>
@@ -3338,7 +3307,7 @@
                                     </p:anim>
                                     <p:anim calcmode="lin" valueType="num">
                                       <p:cBhvr additive="base">
-                                        <p:cTn id="62" dur="500" fill="hold"/>
+                                        <p:cTn id="58" dur="500" fill="hold"/>
                                         <p:tgtEl>
                                           <p:spTgt spid="4">
                                             <p:txEl>
@@ -3373,26 +3342,26 @@
                     </p:cTn>
                   </p:par>
                   <p:par>
-                    <p:cTn id="63" fill="hold">
+                    <p:cTn id="59" fill="hold">
                       <p:stCondLst>
                         <p:cond delay="indefinite"/>
                       </p:stCondLst>
                       <p:childTnLst>
                         <p:par>
-                          <p:cTn id="64" fill="hold">
+                          <p:cTn id="60" fill="hold">
                             <p:stCondLst>
                               <p:cond delay="0"/>
                             </p:stCondLst>
                             <p:childTnLst>
                               <p:par>
-                                <p:cTn id="65" presetID="2" presetClass="entr" presetSubtype="4" fill="hold" grpId="0" nodeType="clickEffect">
+                                <p:cTn id="61" presetID="2" presetClass="entr" presetSubtype="4" fill="hold" grpId="0" nodeType="clickEffect">
                                   <p:stCondLst>
                                     <p:cond delay="0"/>
                                   </p:stCondLst>
                                   <p:childTnLst>
                                     <p:set>
                                       <p:cBhvr>
-                                        <p:cTn id="66" dur="1" fill="hold">
+                                        <p:cTn id="62" dur="1" fill="hold">
                                           <p:stCondLst>
                                             <p:cond delay="0"/>
                                           </p:stCondLst>
@@ -3414,7 +3383,7 @@
                                     </p:set>
                                     <p:anim calcmode="lin" valueType="num">
                                       <p:cBhvr additive="base">
-                                        <p:cTn id="67" dur="500" fill="hold"/>
+                                        <p:cTn id="63" dur="500" fill="hold"/>
                                         <p:tgtEl>
                                           <p:spTgt spid="4">
                                             <p:txEl>
@@ -3441,7 +3410,7 @@
                                     </p:anim>
                                     <p:anim calcmode="lin" valueType="num">
                                       <p:cBhvr additive="base">
-                                        <p:cTn id="68" dur="500" fill="hold"/>
+                                        <p:cTn id="64" dur="500" fill="hold"/>
                                         <p:tgtEl>
                                           <p:spTgt spid="4">
                                             <p:txEl>
@@ -3476,26 +3445,26 @@
                     </p:cTn>
                   </p:par>
                   <p:par>
-                    <p:cTn id="69" fill="hold">
+                    <p:cTn id="65" fill="hold">
                       <p:stCondLst>
                         <p:cond delay="indefinite"/>
                       </p:stCondLst>
                       <p:childTnLst>
                         <p:par>
-                          <p:cTn id="70" fill="hold">
+                          <p:cTn id="66" fill="hold">
                             <p:stCondLst>
                               <p:cond delay="0"/>
                             </p:stCondLst>
                             <p:childTnLst>
                               <p:par>
-                                <p:cTn id="71" presetID="2" presetClass="entr" presetSubtype="4" fill="hold" grpId="0" nodeType="clickEffect">
+                                <p:cTn id="67" presetID="2" presetClass="entr" presetSubtype="4" fill="hold" grpId="0" nodeType="clickEffect">
                                   <p:stCondLst>
                                     <p:cond delay="0"/>
                                   </p:stCondLst>
                                   <p:childTnLst>
                                     <p:set>
                                       <p:cBhvr>
-                                        <p:cTn id="72" dur="1" fill="hold">
+                                        <p:cTn id="68" dur="1" fill="hold">
                                           <p:stCondLst>
                                             <p:cond delay="0"/>
                                           </p:stCondLst>
@@ -3517,7 +3486,7 @@
                                     </p:set>
                                     <p:anim calcmode="lin" valueType="num">
                                       <p:cBhvr additive="base">
-                                        <p:cTn id="73" dur="500" fill="hold"/>
+                                        <p:cTn id="69" dur="500" fill="hold"/>
                                         <p:tgtEl>
                                           <p:spTgt spid="4">
                                             <p:txEl>
@@ -3544,7 +3513,7 @@
                                     </p:anim>
                                     <p:anim calcmode="lin" valueType="num">
                                       <p:cBhvr additive="base">
-                                        <p:cTn id="74" dur="500" fill="hold"/>
+                                        <p:cTn id="70" dur="500" fill="hold"/>
                                         <p:tgtEl>
                                           <p:spTgt spid="4">
                                             <p:txEl>
@@ -3579,26 +3548,26 @@
                     </p:cTn>
                   </p:par>
                   <p:par>
-                    <p:cTn id="75" fill="hold">
+                    <p:cTn id="71" fill="hold">
                       <p:stCondLst>
                         <p:cond delay="indefinite"/>
                       </p:stCondLst>
                       <p:childTnLst>
                         <p:par>
-                          <p:cTn id="76" fill="hold">
+                          <p:cTn id="72" fill="hold">
                             <p:stCondLst>
                               <p:cond delay="0"/>
                             </p:stCondLst>
                             <p:childTnLst>
                               <p:par>
-                                <p:cTn id="77" presetID="2" presetClass="entr" presetSubtype="4" fill="hold" grpId="0" nodeType="clickEffect">
+                                <p:cTn id="73" presetID="2" presetClass="entr" presetSubtype="4" fill="hold" grpId="0" nodeType="clickEffect">
                                   <p:stCondLst>
                                     <p:cond delay="0"/>
                                   </p:stCondLst>
                                   <p:childTnLst>
                                     <p:set>
                                       <p:cBhvr>
-                                        <p:cTn id="78" dur="1" fill="hold">
+                                        <p:cTn id="74" dur="1" fill="hold">
                                           <p:stCondLst>
                                             <p:cond delay="0"/>
                                           </p:stCondLst>
@@ -3620,7 +3589,7 @@
                                     </p:set>
                                     <p:anim calcmode="lin" valueType="num">
                                       <p:cBhvr additive="base">
-                                        <p:cTn id="79" dur="500" fill="hold"/>
+                                        <p:cTn id="75" dur="500" fill="hold"/>
                                         <p:tgtEl>
                                           <p:spTgt spid="4">
                                             <p:txEl>
@@ -3647,7 +3616,7 @@
                                     </p:anim>
                                     <p:anim calcmode="lin" valueType="num">
                                       <p:cBhvr additive="base">
-                                        <p:cTn id="80" dur="500" fill="hold"/>
+                                        <p:cTn id="76" dur="500" fill="hold"/>
                                         <p:tgtEl>
                                           <p:spTgt spid="4">
                                             <p:txEl>

</xml_diff>